<commit_message>
Update figure with classes (correct typo in table)
</commit_message>
<xml_diff>
--- a/docs/userGuideAsciiDoc/images/figures.pptx
+++ b/docs/userGuideAsciiDoc/images/figures.pptx
@@ -261,7 +261,7 @@
           <a:p>
             <a:fld id="{4BC1B26E-3E81-46B0-9161-622306E6D4BA}" type="datetimeFigureOut">
               <a:rPr lang="en-US" smtClean="0"/>
-              <a:t>6/13/2019</a:t>
+              <a:t>8/6/2019</a:t>
             </a:fld>
             <a:endParaRPr lang="en-US"/>
           </a:p>
@@ -459,7 +459,7 @@
           <a:p>
             <a:fld id="{4BC1B26E-3E81-46B0-9161-622306E6D4BA}" type="datetimeFigureOut">
               <a:rPr lang="en-US" smtClean="0"/>
-              <a:t>6/13/2019</a:t>
+              <a:t>8/6/2019</a:t>
             </a:fld>
             <a:endParaRPr lang="en-US"/>
           </a:p>
@@ -667,7 +667,7 @@
           <a:p>
             <a:fld id="{4BC1B26E-3E81-46B0-9161-622306E6D4BA}" type="datetimeFigureOut">
               <a:rPr lang="en-US" smtClean="0"/>
-              <a:t>6/13/2019</a:t>
+              <a:t>8/6/2019</a:t>
             </a:fld>
             <a:endParaRPr lang="en-US"/>
           </a:p>
@@ -865,7 +865,7 @@
           <a:p>
             <a:fld id="{4BC1B26E-3E81-46B0-9161-622306E6D4BA}" type="datetimeFigureOut">
               <a:rPr lang="en-US" smtClean="0"/>
-              <a:t>6/13/2019</a:t>
+              <a:t>8/6/2019</a:t>
             </a:fld>
             <a:endParaRPr lang="en-US"/>
           </a:p>
@@ -1140,7 +1140,7 @@
           <a:p>
             <a:fld id="{4BC1B26E-3E81-46B0-9161-622306E6D4BA}" type="datetimeFigureOut">
               <a:rPr lang="en-US" smtClean="0"/>
-              <a:t>6/13/2019</a:t>
+              <a:t>8/6/2019</a:t>
             </a:fld>
             <a:endParaRPr lang="en-US"/>
           </a:p>
@@ -1405,7 +1405,7 @@
           <a:p>
             <a:fld id="{4BC1B26E-3E81-46B0-9161-622306E6D4BA}" type="datetimeFigureOut">
               <a:rPr lang="en-US" smtClean="0"/>
-              <a:t>6/13/2019</a:t>
+              <a:t>8/6/2019</a:t>
             </a:fld>
             <a:endParaRPr lang="en-US"/>
           </a:p>
@@ -1817,7 +1817,7 @@
           <a:p>
             <a:fld id="{4BC1B26E-3E81-46B0-9161-622306E6D4BA}" type="datetimeFigureOut">
               <a:rPr lang="en-US" smtClean="0"/>
-              <a:t>6/13/2019</a:t>
+              <a:t>8/6/2019</a:t>
             </a:fld>
             <a:endParaRPr lang="en-US"/>
           </a:p>
@@ -1958,7 +1958,7 @@
           <a:p>
             <a:fld id="{4BC1B26E-3E81-46B0-9161-622306E6D4BA}" type="datetimeFigureOut">
               <a:rPr lang="en-US" smtClean="0"/>
-              <a:t>6/13/2019</a:t>
+              <a:t>8/6/2019</a:t>
             </a:fld>
             <a:endParaRPr lang="en-US"/>
           </a:p>
@@ -2071,7 +2071,7 @@
           <a:p>
             <a:fld id="{4BC1B26E-3E81-46B0-9161-622306E6D4BA}" type="datetimeFigureOut">
               <a:rPr lang="en-US" smtClean="0"/>
-              <a:t>6/13/2019</a:t>
+              <a:t>8/6/2019</a:t>
             </a:fld>
             <a:endParaRPr lang="en-US"/>
           </a:p>
@@ -2382,7 +2382,7 @@
           <a:p>
             <a:fld id="{4BC1B26E-3E81-46B0-9161-622306E6D4BA}" type="datetimeFigureOut">
               <a:rPr lang="en-US" smtClean="0"/>
-              <a:t>6/13/2019</a:t>
+              <a:t>8/6/2019</a:t>
             </a:fld>
             <a:endParaRPr lang="en-US"/>
           </a:p>
@@ -2670,7 +2670,7 @@
           <a:p>
             <a:fld id="{4BC1B26E-3E81-46B0-9161-622306E6D4BA}" type="datetimeFigureOut">
               <a:rPr lang="en-US" smtClean="0"/>
-              <a:t>6/13/2019</a:t>
+              <a:t>8/6/2019</a:t>
             </a:fld>
             <a:endParaRPr lang="en-US"/>
           </a:p>
@@ -2911,7 +2911,7 @@
           <a:p>
             <a:fld id="{4BC1B26E-3E81-46B0-9161-622306E6D4BA}" type="datetimeFigureOut">
               <a:rPr lang="en-US" smtClean="0"/>
-              <a:t>6/13/2019</a:t>
+              <a:t>8/6/2019</a:t>
             </a:fld>
             <a:endParaRPr lang="en-US"/>
           </a:p>
@@ -3725,7 +3725,7 @@
           <p:nvPr>
             <p:extLst>
               <p:ext uri="{D42A27DB-BD31-4B8C-83A1-F6EECF244321}">
-                <p14:modId xmlns:p14="http://schemas.microsoft.com/office/powerpoint/2010/main" val="1714129211"/>
+                <p14:modId xmlns:p14="http://schemas.microsoft.com/office/powerpoint/2010/main" val="1446511740"/>
               </p:ext>
             </p:extLst>
           </p:nvPr>
@@ -3939,9 +3939,10 @@
                         <a:defRPr/>
                       </a:pPr>
                       <a:r>
-                        <a:rPr lang="en-US" dirty="0"/>
-                        <a:t>NamedEntityUnit</a:t>
+                        <a:rPr lang="en-US" dirty="0" err="1"/>
+                        <a:t>NamedEntityWithUnit</a:t>
                       </a:r>
+                      <a:endParaRPr lang="en-US" dirty="0"/>
                     </a:p>
                   </a:txBody>
                   <a:tcPr/>

</xml_diff>